<commit_message>
Lisää linkki Software Patterneihin, Wikipedia
</commit_message>
<xml_diff>
--- a/06_ohjelmistoarkkitehtuurit_ja_patternit/SoftwareArchitecturesAndPatterns.pptx
+++ b/06_ohjelmistoarkkitehtuurit_ja_patternit/SoftwareArchitecturesAndPatterns.pptx
@@ -8104,12 +8104,8 @@
           </a:p>
           <a:p>
             <a:r>
-              <a:rPr lang="fi-FI" dirty="0" err="1"/>
-              <a:t>Unknow</a:t>
-            </a:r>
-            <a:r>
-              <a:rPr lang="fi-FI" dirty="0"/>
-              <a:t> </a:t>
+              <a:rPr lang="fi-FI" dirty="0"/>
+              <a:t>Unknown </a:t>
             </a:r>
             <a:r>
               <a:rPr lang="fi-FI" dirty="0" err="1"/>
@@ -14105,6 +14101,16 @@
             <a:r>
               <a:rPr lang="fi-FI" dirty="0" err="1"/>
               <a:t>level</a:t>
+            </a:r>
+            <a:r>
+              <a:rPr lang="fi-FI"/>
+              <a:t>    </a:t>
+            </a:r>
+            <a:r>
+              <a:rPr lang="fi-FI" u="sng">
+                <a:hlinkClick r:id="rId2"/>
+              </a:rPr>
+              <a:t>https://en.wikipedia.org/wiki/Software_design_pattern</a:t>
             </a:r>
             <a:endParaRPr lang="fi-FI" dirty="0"/>
           </a:p>
@@ -16210,6 +16216,21 @@
 </file>
 
 <file path=customXml/item1.xml><?xml version="1.0" encoding="utf-8"?>
+<p:properties xmlns:p="http://schemas.microsoft.com/office/2006/metadata/properties" xmlns:xsi="http://www.w3.org/2001/XMLSchema-instance" xmlns:pc="http://schemas.microsoft.com/office/infopath/2007/PartnerControls">
+  <documentManagement/>
+</p:properties>
+</file>
+
+<file path=customXml/item2.xml><?xml version="1.0" encoding="utf-8"?>
+<?mso-contentType ?>
+<FormTemplates xmlns="http://schemas.microsoft.com/sharepoint/v3/contenttype/forms">
+  <Display>DocumentLibraryForm</Display>
+  <Edit>DocumentLibraryForm</Edit>
+  <New>DocumentLibraryForm</New>
+</FormTemplates>
+</file>
+
+<file path=customXml/item3.xml><?xml version="1.0" encoding="utf-8"?>
 <ct:contentTypeSchema xmlns:ct="http://schemas.microsoft.com/office/2006/metadata/contentType" xmlns:ma="http://schemas.microsoft.com/office/2006/metadata/properties/metaAttributes" ct:_="" ma:_="" ma:contentTypeName="Document" ma:contentTypeID="0x0101008A03D813BDC1354CB9CC31017C1D507E" ma:contentTypeVersion="14" ma:contentTypeDescription="Create a new document." ma:contentTypeScope="" ma:versionID="8d610081a03aab79f4f6816a8abae875">
   <xsd:schema xmlns:xsd="http://www.w3.org/2001/XMLSchema" xmlns:xs="http://www.w3.org/2001/XMLSchema" xmlns:p="http://schemas.microsoft.com/office/2006/metadata/properties" xmlns:ns3="23ce7308-0f1e-43e9-aba3-b9c7d7318f5c" xmlns:ns4="a915d5db-83f9-4a1c-939a-8e707aa4dcbb" targetNamespace="http://schemas.microsoft.com/office/2006/metadata/properties" ma:root="true" ma:fieldsID="66de0da61abf087c2e24f3b57cbf177f" ns3:_="" ns4:_="">
     <xsd:import namespace="23ce7308-0f1e-43e9-aba3-b9c7d7318f5c"/>
@@ -16438,22 +16459,32 @@
 </ct:contentTypeSchema>
 </file>
 
-<file path=customXml/item2.xml><?xml version="1.0" encoding="utf-8"?>
-<?mso-contentType ?>
-<FormTemplates xmlns="http://schemas.microsoft.com/sharepoint/v3/contenttype/forms">
-  <Display>DocumentLibraryForm</Display>
-  <Edit>DocumentLibraryForm</Edit>
-  <New>DocumentLibraryForm</New>
-</FormTemplates>
+<file path=customXml/itemProps1.xml><?xml version="1.0" encoding="utf-8"?>
+<ds:datastoreItem xmlns:ds="http://schemas.openxmlformats.org/officeDocument/2006/customXml" ds:itemID="{DED4E12E-7268-4B03-A47B-0755D62B5E31}">
+  <ds:schemaRefs>
+    <ds:schemaRef ds:uri="http://schemas.microsoft.com/office/2006/documentManagement/types"/>
+    <ds:schemaRef ds:uri="http://purl.org/dc/elements/1.1/"/>
+    <ds:schemaRef ds:uri="http://www.w3.org/XML/1998/namespace"/>
+    <ds:schemaRef ds:uri="a915d5db-83f9-4a1c-939a-8e707aa4dcbb"/>
+    <ds:schemaRef ds:uri="http://schemas.openxmlformats.org/package/2006/metadata/core-properties"/>
+    <ds:schemaRef ds:uri="http://purl.org/dc/terms/"/>
+    <ds:schemaRef ds:uri="http://schemas.microsoft.com/office/2006/metadata/properties"/>
+    <ds:schemaRef ds:uri="http://schemas.microsoft.com/office/infopath/2007/PartnerControls"/>
+    <ds:schemaRef ds:uri="23ce7308-0f1e-43e9-aba3-b9c7d7318f5c"/>
+    <ds:schemaRef ds:uri="http://purl.org/dc/dcmitype/"/>
+  </ds:schemaRefs>
+</ds:datastoreItem>
 </file>
 
-<file path=customXml/item3.xml><?xml version="1.0" encoding="utf-8"?>
-<p:properties xmlns:p="http://schemas.microsoft.com/office/2006/metadata/properties" xmlns:xsi="http://www.w3.org/2001/XMLSchema-instance" xmlns:pc="http://schemas.microsoft.com/office/infopath/2007/PartnerControls">
-  <documentManagement/>
-</p:properties>
+<file path=customXml/itemProps2.xml><?xml version="1.0" encoding="utf-8"?>
+<ds:datastoreItem xmlns:ds="http://schemas.openxmlformats.org/officeDocument/2006/customXml" ds:itemID="{D546C03B-CD3A-4EA0-AAA4-0E00E896454E}">
+  <ds:schemaRefs>
+    <ds:schemaRef ds:uri="http://schemas.microsoft.com/sharepoint/v3/contenttype/forms"/>
+  </ds:schemaRefs>
+</ds:datastoreItem>
 </file>
 
-<file path=customXml/itemProps1.xml><?xml version="1.0" encoding="utf-8"?>
+<file path=customXml/itemProps3.xml><?xml version="1.0" encoding="utf-8"?>
 <ds:datastoreItem xmlns:ds="http://schemas.openxmlformats.org/officeDocument/2006/customXml" ds:itemID="{66BA7D05-A425-4449-B909-FD98A040947D}">
   <ds:schemaRefs>
     <ds:schemaRef ds:uri="http://schemas.microsoft.com/office/2006/metadata/contentType"/>
@@ -16470,29 +16501,4 @@
     <ds:schemaRef ds:uri="http://schemas.microsoft.com/internal/obd"/>
   </ds:schemaRefs>
 </ds:datastoreItem>
-</file>
-
-<file path=customXml/itemProps2.xml><?xml version="1.0" encoding="utf-8"?>
-<ds:datastoreItem xmlns:ds="http://schemas.openxmlformats.org/officeDocument/2006/customXml" ds:itemID="{D546C03B-CD3A-4EA0-AAA4-0E00E896454E}">
-  <ds:schemaRefs>
-    <ds:schemaRef ds:uri="http://schemas.microsoft.com/sharepoint/v3/contenttype/forms"/>
-  </ds:schemaRefs>
-</ds:datastoreItem>
-</file>
-
-<file path=customXml/itemProps3.xml><?xml version="1.0" encoding="utf-8"?>
-<ds:datastoreItem xmlns:ds="http://schemas.openxmlformats.org/officeDocument/2006/customXml" ds:itemID="{DED4E12E-7268-4B03-A47B-0755D62B5E31}">
-  <ds:schemaRefs>
-    <ds:schemaRef ds:uri="http://www.w3.org/XML/1998/namespace"/>
-    <ds:schemaRef ds:uri="http://schemas.microsoft.com/office/2006/metadata/properties"/>
-    <ds:schemaRef ds:uri="http://purl.org/dc/terms/"/>
-    <ds:schemaRef ds:uri="a915d5db-83f9-4a1c-939a-8e707aa4dcbb"/>
-    <ds:schemaRef ds:uri="http://purl.org/dc/elements/1.1/"/>
-    <ds:schemaRef ds:uri="http://schemas.microsoft.com/office/infopath/2007/PartnerControls"/>
-    <ds:schemaRef ds:uri="http://schemas.microsoft.com/office/2006/documentManagement/types"/>
-    <ds:schemaRef ds:uri="http://schemas.openxmlformats.org/package/2006/metadata/core-properties"/>
-    <ds:schemaRef ds:uri="23ce7308-0f1e-43e9-aba3-b9c7d7318f5c"/>
-    <ds:schemaRef ds:uri="http://purl.org/dc/dcmitype/"/>
-  </ds:schemaRefs>
-</ds:datastoreItem>
 </file>
</xml_diff>